<commit_message>
minor modification to command list
</commit_message>
<xml_diff>
--- a/L03-git.pptx
+++ b/L03-git.pptx
@@ -1010,7 +1010,7 @@
           </a:ln>
           <a:extLst>
             <a:ext uri="{909E8E84-426E-40dd-AFC4-6F175D3DCCD1}">
-              <a14:hiddenFill xmlns:a14="http://schemas.microsoft.com/office/drawing/2010/main" xmlns="">
+              <a14:hiddenFill xmlns="" xmlns:a14="http://schemas.microsoft.com/office/drawing/2010/main">
                 <a:solidFill>
                   <a:srgbClr val="FFFFFF"/>
                 </a:solidFill>
@@ -1056,7 +1056,7 @@
           </a:ln>
           <a:extLst>
             <a:ext uri="{909E8E84-426E-40dd-AFC4-6F175D3DCCD1}">
-              <a14:hiddenFill xmlns:a14="http://schemas.microsoft.com/office/drawing/2010/main" xmlns="">
+              <a14:hiddenFill xmlns="" xmlns:a14="http://schemas.microsoft.com/office/drawing/2010/main">
                 <a:solidFill>
                   <a:srgbClr val="FFFFFF"/>
                 </a:solidFill>
@@ -1102,7 +1102,7 @@
           </a:ln>
           <a:extLst>
             <a:ext uri="{909E8E84-426E-40dd-AFC4-6F175D3DCCD1}">
-              <a14:hiddenFill xmlns:a14="http://schemas.microsoft.com/office/drawing/2010/main" xmlns="">
+              <a14:hiddenFill xmlns="" xmlns:a14="http://schemas.microsoft.com/office/drawing/2010/main">
                 <a:solidFill>
                   <a:srgbClr val="FFFFFF"/>
                 </a:solidFill>
@@ -1146,7 +1146,7 @@
           </a:ln>
           <a:extLst>
             <a:ext uri="{909E8E84-426E-40dd-AFC4-6F175D3DCCD1}">
-              <a14:hiddenFill xmlns:a14="http://schemas.microsoft.com/office/drawing/2010/main" xmlns="">
+              <a14:hiddenFill xmlns="" xmlns:a14="http://schemas.microsoft.com/office/drawing/2010/main">
                 <a:solidFill>
                   <a:srgbClr val="FFFFFF"/>
                 </a:solidFill>
@@ -1192,7 +1192,7 @@
           </a:ln>
           <a:extLst>
             <a:ext uri="{909E8E84-426E-40dd-AFC4-6F175D3DCCD1}">
-              <a14:hiddenFill xmlns:a14="http://schemas.microsoft.com/office/drawing/2010/main" xmlns="">
+              <a14:hiddenFill xmlns="" xmlns:a14="http://schemas.microsoft.com/office/drawing/2010/main">
                 <a:solidFill>
                   <a:srgbClr val="FFFFFF"/>
                 </a:solidFill>
@@ -1238,7 +1238,7 @@
           </a:ln>
           <a:extLst>
             <a:ext uri="{909E8E84-426E-40dd-AFC4-6F175D3DCCD1}">
-              <a14:hiddenFill xmlns:a14="http://schemas.microsoft.com/office/drawing/2010/main" xmlns="">
+              <a14:hiddenFill xmlns="" xmlns:a14="http://schemas.microsoft.com/office/drawing/2010/main">
                 <a:solidFill>
                   <a:srgbClr val="FFFFFF"/>
                 </a:solidFill>
@@ -9555,7 +9555,7 @@
         <p:spPr/>
         <p:txBody>
           <a:bodyPr>
-            <a:normAutofit/>
+            <a:normAutofit fontScale="92500" lnSpcReduction="10000"/>
           </a:bodyPr>
           <a:lstStyle/>
           <a:p>
@@ -9678,6 +9678,48 @@
                 </a:solidFill>
               </a:rPr>
               <a:t>tag, branch</a:t>
+            </a:r>
+          </a:p>
+          <a:p>
+            <a:pPr lvl="1"/>
+            <a:r>
+              <a:rPr lang="en-US" dirty="0"/>
+              <a:t>Synchronization with remote</a:t>
+            </a:r>
+          </a:p>
+          <a:p>
+            <a:pPr lvl="2"/>
+            <a:r>
+              <a:rPr lang="en-US" b="1" dirty="0">
+                <a:solidFill>
+                  <a:srgbClr val="3366FF"/>
+                </a:solidFill>
+              </a:rPr>
+              <a:t>push</a:t>
+            </a:r>
+            <a:r>
+              <a:rPr lang="en-US" dirty="0">
+                <a:solidFill>
+                  <a:srgbClr val="3366FF"/>
+                </a:solidFill>
+              </a:rPr>
+              <a:t>,</a:t>
+            </a:r>
+            <a:r>
+              <a:rPr lang="en-US" b="1" dirty="0">
+                <a:solidFill>
+                  <a:srgbClr val="3366FF"/>
+                </a:solidFill>
+              </a:rPr>
+              <a:t> pull</a:t>
+            </a:r>
+            <a:r>
+              <a:rPr lang="en-US" dirty="0">
+                <a:solidFill>
+                  <a:srgbClr val="3366FF"/>
+                </a:solidFill>
+              </a:rPr>
+              <a:t>, fetch, sync</a:t>
             </a:r>
           </a:p>
         </p:txBody>
@@ -10771,7 +10813,7 @@
           <p:nvPr/>
         </p:nvPicPr>
         <mc:AlternateContent xmlns:mc="http://schemas.openxmlformats.org/markup-compatibility/2006">
-          <mc:Choice xmlns="" xmlns:mv="urn:schemas-microsoft-com:mac:vml" xmlns:ma="http://schemas.microsoft.com/office/mac/drawingml/2008/main" Requires="ma">
+          <mc:Choice xmlns:ma="http://schemas.microsoft.com/office/mac/drawingml/2008/main" xmlns:mv="urn:schemas-microsoft-com:mac:vml" xmlns="" Requires="ma">
             <p:blipFill>
               <a:blip r:embed="rId2"/>
               <a:stretch>

</xml_diff>

<commit_message>
added minard activitiy & design lecture; otherwise minor changes
</commit_message>
<xml_diff>
--- a/L03-git.pptx
+++ b/L03-git.pptx
@@ -1010,7 +1010,7 @@
           </a:ln>
           <a:extLst>
             <a:ext uri="{909E8E84-426E-40dd-AFC4-6F175D3DCCD1}">
-              <a14:hiddenFill xmlns="" xmlns:a14="http://schemas.microsoft.com/office/drawing/2010/main">
+              <a14:hiddenFill xmlns:a14="http://schemas.microsoft.com/office/drawing/2010/main" xmlns="">
                 <a:solidFill>
                   <a:srgbClr val="FFFFFF"/>
                 </a:solidFill>
@@ -1056,7 +1056,7 @@
           </a:ln>
           <a:extLst>
             <a:ext uri="{909E8E84-426E-40dd-AFC4-6F175D3DCCD1}">
-              <a14:hiddenFill xmlns="" xmlns:a14="http://schemas.microsoft.com/office/drawing/2010/main">
+              <a14:hiddenFill xmlns:a14="http://schemas.microsoft.com/office/drawing/2010/main" xmlns="">
                 <a:solidFill>
                   <a:srgbClr val="FFFFFF"/>
                 </a:solidFill>
@@ -1102,7 +1102,7 @@
           </a:ln>
           <a:extLst>
             <a:ext uri="{909E8E84-426E-40dd-AFC4-6F175D3DCCD1}">
-              <a14:hiddenFill xmlns="" xmlns:a14="http://schemas.microsoft.com/office/drawing/2010/main">
+              <a14:hiddenFill xmlns:a14="http://schemas.microsoft.com/office/drawing/2010/main" xmlns="">
                 <a:solidFill>
                   <a:srgbClr val="FFFFFF"/>
                 </a:solidFill>
@@ -1146,7 +1146,7 @@
           </a:ln>
           <a:extLst>
             <a:ext uri="{909E8E84-426E-40dd-AFC4-6F175D3DCCD1}">
-              <a14:hiddenFill xmlns="" xmlns:a14="http://schemas.microsoft.com/office/drawing/2010/main">
+              <a14:hiddenFill xmlns:a14="http://schemas.microsoft.com/office/drawing/2010/main" xmlns="">
                 <a:solidFill>
                   <a:srgbClr val="FFFFFF"/>
                 </a:solidFill>
@@ -1192,7 +1192,7 @@
           </a:ln>
           <a:extLst>
             <a:ext uri="{909E8E84-426E-40dd-AFC4-6F175D3DCCD1}">
-              <a14:hiddenFill xmlns="" xmlns:a14="http://schemas.microsoft.com/office/drawing/2010/main">
+              <a14:hiddenFill xmlns:a14="http://schemas.microsoft.com/office/drawing/2010/main" xmlns="">
                 <a:solidFill>
                   <a:srgbClr val="FFFFFF"/>
                 </a:solidFill>
@@ -1238,7 +1238,7 @@
           </a:ln>
           <a:extLst>
             <a:ext uri="{909E8E84-426E-40dd-AFC4-6F175D3DCCD1}">
-              <a14:hiddenFill xmlns="" xmlns:a14="http://schemas.microsoft.com/office/drawing/2010/main">
+              <a14:hiddenFill xmlns:a14="http://schemas.microsoft.com/office/drawing/2010/main" xmlns="">
                 <a:solidFill>
                   <a:srgbClr val="FFFFFF"/>
                 </a:solidFill>
@@ -8969,6 +8969,30 @@
               <a:t>Many YouTube videos</a:t>
             </a:r>
           </a:p>
+          <a:p>
+            <a:pPr lvl="2"/>
+            <a:r>
+              <a:rPr lang="en-US" dirty="0"/>
+              <a:t>ex. </a:t>
+            </a:r>
+            <a:r>
+              <a:rPr lang="en-US" dirty="0">
+                <a:hlinkClick r:id="rId7"/>
+              </a:rPr>
+              <a:t>https://www.youtube.com/watch?v</a:t>
+            </a:r>
+            <a:r>
+              <a:rPr lang="en-US">
+                <a:hlinkClick r:id="rId7"/>
+              </a:rPr>
+              <a:t>=HVsySz-h9r4</a:t>
+            </a:r>
+            <a:r>
+              <a:rPr lang="en-US"/>
+              <a:t> </a:t>
+            </a:r>
+            <a:endParaRPr lang="en-US" dirty="0"/>
+          </a:p>
         </p:txBody>
       </p:sp>
       <p:sp>
@@ -10813,7 +10837,7 @@
           <p:nvPr/>
         </p:nvPicPr>
         <mc:AlternateContent xmlns:mc="http://schemas.openxmlformats.org/markup-compatibility/2006">
-          <mc:Choice xmlns:ma="http://schemas.microsoft.com/office/mac/drawingml/2008/main" xmlns:mv="urn:schemas-microsoft-com:mac:vml" xmlns="" Requires="ma">
+          <mc:Choice xmlns="" xmlns:mv="urn:schemas-microsoft-com:mac:vml" xmlns:ma="http://schemas.microsoft.com/office/mac/drawingml/2008/main" Requires="ma">
             <p:blipFill>
               <a:blip r:embed="rId2"/>
               <a:stretch>

</xml_diff>